<commit_message>
update final term antenna
</commit_message>
<xml_diff>
--- a/XLTHS_NC/Slides/DoHaiSon Final-term.pptx
+++ b/XLTHS_NC/Slides/DoHaiSon Final-term.pptx
@@ -251,7 +251,7 @@
           <a:p>
             <a:fld id="{183533D8-0E98-4189-8902-B116DDE2DD01}" type="datetimeFigureOut">
               <a:rPr lang="en-US" smtClean="0"/>
-              <a:t>6/4/2021</a:t>
+              <a:t>10/15/2021</a:t>
             </a:fld>
             <a:endParaRPr lang="en-US"/>
           </a:p>
@@ -649,7 +649,7 @@
           <a:p>
             <a:fld id="{AB46277E-1D56-4F20-B95D-108C082A698D}" type="datetime1">
               <a:rPr lang="en-US" smtClean="0"/>
-              <a:t>6/4/2021</a:t>
+              <a:t>10/15/2021</a:t>
             </a:fld>
             <a:endParaRPr lang="en-US"/>
           </a:p>
@@ -828,7 +828,7 @@
           <a:p>
             <a:fld id="{27D03D97-D49D-4246-8E4B-34D5B9A76678}" type="datetime1">
               <a:rPr lang="en-US" smtClean="0"/>
-              <a:t>6/4/2021</a:t>
+              <a:t>10/15/2021</a:t>
             </a:fld>
             <a:endParaRPr lang="en-US"/>
           </a:p>
@@ -1008,7 +1008,7 @@
           <a:p>
             <a:fld id="{9C3AA091-E74D-4D58-93AA-E18869F9DDD5}" type="datetime1">
               <a:rPr lang="en-US" smtClean="0"/>
-              <a:t>6/4/2021</a:t>
+              <a:t>10/15/2021</a:t>
             </a:fld>
             <a:endParaRPr lang="en-US"/>
           </a:p>
@@ -1178,7 +1178,7 @@
           <a:p>
             <a:fld id="{D6B15FDF-5694-4043-B386-8236201F33CC}" type="datetime1">
               <a:rPr lang="en-US" smtClean="0"/>
-              <a:t>6/4/2021</a:t>
+              <a:t>10/15/2021</a:t>
             </a:fld>
             <a:endParaRPr lang="en-US"/>
           </a:p>
@@ -1422,7 +1422,7 @@
           <a:p>
             <a:fld id="{0EE34C86-0E54-4275-BFCC-866399908024}" type="datetime1">
               <a:rPr lang="en-US" smtClean="0"/>
-              <a:t>6/4/2021</a:t>
+              <a:t>10/15/2021</a:t>
             </a:fld>
             <a:endParaRPr lang="en-US"/>
           </a:p>
@@ -1654,7 +1654,7 @@
           <a:p>
             <a:fld id="{0E03C058-E786-4A46-8EB8-C4C834D51212}" type="datetime1">
               <a:rPr lang="en-US" smtClean="0"/>
-              <a:t>6/4/2021</a:t>
+              <a:t>10/15/2021</a:t>
             </a:fld>
             <a:endParaRPr lang="en-US"/>
           </a:p>
@@ -2021,7 +2021,7 @@
           <a:p>
             <a:fld id="{55FFED9E-B8D6-45C0-9F85-2558FCFB441E}" type="datetime1">
               <a:rPr lang="en-US" smtClean="0"/>
-              <a:t>6/4/2021</a:t>
+              <a:t>10/15/2021</a:t>
             </a:fld>
             <a:endParaRPr lang="en-US"/>
           </a:p>
@@ -2139,7 +2139,7 @@
           <a:p>
             <a:fld id="{E2BA13BA-C4D3-493B-8F8B-4880F7A1E0BB}" type="datetime1">
               <a:rPr lang="en-US" smtClean="0"/>
-              <a:t>6/4/2021</a:t>
+              <a:t>10/15/2021</a:t>
             </a:fld>
             <a:endParaRPr lang="en-US"/>
           </a:p>
@@ -2234,7 +2234,7 @@
           <a:p>
             <a:fld id="{64FED3DE-7E4B-4CBF-B1DE-575A920EC876}" type="datetime1">
               <a:rPr lang="en-US" smtClean="0"/>
-              <a:t>6/4/2021</a:t>
+              <a:t>10/15/2021</a:t>
             </a:fld>
             <a:endParaRPr lang="en-US"/>
           </a:p>
@@ -2511,7 +2511,7 @@
           <a:p>
             <a:fld id="{DDCDD4C5-421D-4553-AACF-F3E4F1F019C6}" type="datetime1">
               <a:rPr lang="en-US" smtClean="0"/>
-              <a:t>6/4/2021</a:t>
+              <a:t>10/15/2021</a:t>
             </a:fld>
             <a:endParaRPr lang="en-US"/>
           </a:p>
@@ -2768,7 +2768,7 @@
           <a:p>
             <a:fld id="{1488D037-14A2-49B5-8583-FD9F3317089D}" type="datetime1">
               <a:rPr lang="en-US" smtClean="0"/>
-              <a:t>6/4/2021</a:t>
+              <a:t>10/15/2021</a:t>
             </a:fld>
             <a:endParaRPr lang="en-US"/>
           </a:p>
@@ -2990,7 +2990,7 @@
           <a:p>
             <a:fld id="{60A7E08E-FC19-4901-9EBF-23AA455FF2AD}" type="datetime1">
               <a:rPr lang="en-US" smtClean="0"/>
-              <a:t>6/4/2021</a:t>
+              <a:t>10/15/2021</a:t>
             </a:fld>
             <a:endParaRPr lang="en-US"/>
           </a:p>
@@ -10986,8 +10986,8 @@
           </a:p>
         </p:txBody>
       </p:sp>
-      <mc:AlternateContent xmlns:mc="http://schemas.openxmlformats.org/markup-compatibility/2006" xmlns:a14="http://schemas.microsoft.com/office/drawing/2010/main">
-        <mc:Choice Requires="a14">
+      <mc:AlternateContent xmlns:mc="http://schemas.openxmlformats.org/markup-compatibility/2006">
+        <mc:Choice xmlns:a14="http://schemas.microsoft.com/office/drawing/2010/main" Requires="a14">
           <p:sp>
             <p:nvSpPr>
               <p:cNvPr id="7" name="TextBox 6">
@@ -11021,7 +11021,7 @@
                   <a:buChar char="•"/>
                 </a:pPr>
                 <a:r>
-                  <a:rPr lang="en-US" b="1">
+                  <a:rPr lang="en-US" b="1" dirty="0">
                     <a:latin typeface="Arial" panose="020B0604020202020204" pitchFamily="34" charset="0"/>
                     <a:cs typeface="Arial" panose="020B0604020202020204" pitchFamily="34" charset="0"/>
                   </a:rPr>
@@ -11034,28 +11034,35 @@
                   <a:buChar char="o"/>
                 </a:pPr>
                 <a:r>
-                  <a:rPr lang="vi-VN" sz="1600">
+                  <a:rPr lang="vi-VN" sz="1600" dirty="0">
                     <a:latin typeface="Arial" panose="020B0604020202020204" pitchFamily="34" charset="0"/>
                     <a:cs typeface="Arial" panose="020B0604020202020204" pitchFamily="34" charset="0"/>
                   </a:rPr>
                   <a:t>Optimize </a:t>
                 </a:r>
                 <a:r>
-                  <a:rPr lang="en-US" sz="1600">
+                  <a:rPr lang="en-US" sz="1600" dirty="0" err="1">
                     <a:latin typeface="Arial" panose="020B0604020202020204" pitchFamily="34" charset="0"/>
                     <a:cs typeface="Arial" panose="020B0604020202020204" pitchFamily="34" charset="0"/>
                   </a:rPr>
-                  <a:t>freq domain </a:t>
+                  <a:t>freq</a:t>
                 </a:r>
                 <a:r>
-                  <a:rPr lang="vi-VN" sz="1600">
+                  <a:rPr lang="en-US" sz="1600" dirty="0">
+                    <a:latin typeface="Arial" panose="020B0604020202020204" pitchFamily="34" charset="0"/>
+                    <a:cs typeface="Arial" panose="020B0604020202020204" pitchFamily="34" charset="0"/>
+                  </a:rPr>
+                  <a:t> domain </a:t>
+                </a:r>
+                <a:r>
+                  <a:rPr lang="vi-VN" sz="1600" dirty="0">
                     <a:latin typeface="Arial" panose="020B0604020202020204" pitchFamily="34" charset="0"/>
                     <a:cs typeface="Arial" panose="020B0604020202020204" pitchFamily="34" charset="0"/>
                   </a:rPr>
                   <a:t>efficiency </a:t>
                 </a:r>
                 <a:r>
-                  <a:rPr lang="en-US" sz="1600">
+                  <a:rPr lang="en-US" sz="1600" dirty="0">
                     <a:latin typeface="Arial" panose="020B0604020202020204" pitchFamily="34" charset="0"/>
                     <a:cs typeface="Arial" panose="020B0604020202020204" pitchFamily="34" charset="0"/>
                   </a:rPr>
@@ -11068,20 +11075,20 @@
                   <a:buChar char="o"/>
                 </a:pPr>
                 <a:r>
-                  <a:rPr lang="en-US" sz="1600">
+                  <a:rPr lang="en-US" sz="1600" dirty="0">
                     <a:latin typeface="Arial" panose="020B0604020202020204" pitchFamily="34" charset="0"/>
                     <a:cs typeface="Arial" panose="020B0604020202020204" pitchFamily="34" charset="0"/>
                   </a:rPr>
                   <a:t>Increase the quality of service (QoS): spatial modulation (SM), </a:t>
                 </a:r>
                 <a:r>
-                  <a:rPr lang="en-US" sz="1600">
+                  <a:rPr lang="en-US" sz="1600" dirty="0">
                     <a:effectLst/>
                     <a:latin typeface="Arial" panose="020B0604020202020204" pitchFamily="34" charset="0"/>
                   </a:rPr>
                   <a:t>media-based modulation (MBM), … </a:t>
                 </a:r>
-                <a:endParaRPr lang="en-US" sz="1600">
+                <a:endParaRPr lang="en-US" sz="1600" dirty="0">
                   <a:latin typeface="Arial" panose="020B0604020202020204" pitchFamily="34" charset="0"/>
                   <a:cs typeface="Arial" panose="020B0604020202020204" pitchFamily="34" charset="0"/>
                 </a:endParaRPr>
@@ -11092,7 +11099,7 @@
                   <a:buChar char="o"/>
                 </a:pPr>
                 <a:r>
-                  <a:rPr lang="en-US" sz="1600">
+                  <a:rPr lang="en-US" sz="1600" dirty="0">
                     <a:latin typeface="Arial" panose="020B0604020202020204" pitchFamily="34" charset="0"/>
                     <a:cs typeface="Arial" panose="020B0604020202020204" pitchFamily="34" charset="0"/>
                   </a:rPr>
@@ -11105,7 +11112,7 @@
                   <a:buChar char="o"/>
                 </a:pPr>
                 <a:r>
-                  <a:rPr lang="en-US" sz="1600">
+                  <a:rPr lang="en-US" sz="1600" dirty="0">
                     <a:latin typeface="Arial" panose="020B0604020202020204" pitchFamily="34" charset="0"/>
                     <a:cs typeface="Arial" panose="020B0604020202020204" pitchFamily="34" charset="0"/>
                   </a:rPr>
@@ -11118,10 +11125,10 @@
                   <a:buChar char="o"/>
                 </a:pPr>
                 <a:r>
-                  <a:rPr lang="en-US" sz="1600">
+                  <a:rPr lang="en-US" sz="1600" dirty="0">
                     <a:latin typeface="Arial" panose="020B0604020202020204" pitchFamily="34" charset="0"/>
                   </a:rPr>
-                  <a:t>Can we optimize enviroment (smart enviroment) to improve efficiency of wireless communication?</a:t>
+                  <a:t>Can we optimize environment (smart environment) to improve efficiency of wireless communication?</a:t>
                 </a:r>
               </a:p>
               <a:p>
@@ -11138,19 +11145,19 @@
                   </m:oMath>
                 </a14:m>
                 <a:r>
-                  <a:rPr lang="en-US" sz="1600">
+                  <a:rPr lang="en-US" sz="1600" dirty="0">
                     <a:latin typeface="Arial" panose="020B0604020202020204" pitchFamily="34" charset="0"/>
                   </a:rPr>
                   <a:t> Reconfigurable intelligent surfaces (RIS) (2018) </a:t>
                 </a:r>
                 <a:r>
-                  <a:rPr lang="en-US" sz="1600" baseline="30000">
+                  <a:rPr lang="en-US" sz="1600" baseline="30000" dirty="0">
                     <a:latin typeface="Arial" panose="020B0604020202020204" pitchFamily="34" charset="0"/>
                   </a:rPr>
                   <a:t>2</a:t>
                 </a:r>
                 <a:r>
-                  <a:rPr lang="en-US" sz="1600">
+                  <a:rPr lang="en-US" sz="1600" dirty="0">
                     <a:latin typeface="Arial" panose="020B0604020202020204" pitchFamily="34" charset="0"/>
                   </a:rPr>
                   <a:t>.</a:t>
@@ -11158,7 +11165,7 @@
               </a:p>
               <a:p>
                 <a:pPr lvl="2"/>
-                <a:endParaRPr lang="en-US" sz="1600">
+                <a:endParaRPr lang="en-US" sz="1600" dirty="0">
                   <a:latin typeface="Arial" panose="020B0604020202020204" pitchFamily="34" charset="0"/>
                 </a:endParaRPr>
               </a:p>
@@ -11167,7 +11174,7 @@
                   <a:buFont typeface="Courier New" panose="02070309020205020404" pitchFamily="49" charset="0"/>
                   <a:buChar char="o"/>
                 </a:pPr>
-                <a:endParaRPr lang="vi-VN" sz="1600">
+                <a:endParaRPr lang="vi-VN" sz="1600" dirty="0">
                   <a:latin typeface="Arial" panose="020B0604020202020204" pitchFamily="34" charset="0"/>
                   <a:cs typeface="Arial" panose="020B0604020202020204" pitchFamily="34" charset="0"/>
                 </a:endParaRPr>
@@ -11175,7 +11182,7 @@
             </p:txBody>
           </p:sp>
         </mc:Choice>
-        <mc:Fallback xmlns="">
+        <mc:Fallback>
           <p:sp>
             <p:nvSpPr>
               <p:cNvPr id="7" name="TextBox 6">
@@ -14714,8 +14721,8 @@
           </a:p>
         </p:txBody>
       </p:sp>
-      <mc:AlternateContent xmlns:mc="http://schemas.openxmlformats.org/markup-compatibility/2006">
-        <mc:Choice xmlns:a14="http://schemas.microsoft.com/office/drawing/2010/main" Requires="a14">
+      <mc:AlternateContent xmlns:mc="http://schemas.openxmlformats.org/markup-compatibility/2006" xmlns:a14="http://schemas.microsoft.com/office/drawing/2010/main">
+        <mc:Choice Requires="a14">
           <p:sp>
             <p:nvSpPr>
               <p:cNvPr id="25" name="TextBox 24">
@@ -14892,7 +14899,7 @@
             </p:txBody>
           </p:sp>
         </mc:Choice>
-        <mc:Fallback>
+        <mc:Fallback xmlns="">
           <p:sp>
             <p:nvSpPr>
               <p:cNvPr id="25" name="TextBox 24">

</xml_diff>